<commit_message>
d14 is checked. d15 is for reducing words
</commit_message>
<xml_diff>
--- a/documentation/Poster_ppt/NEW_POSTER.pptx
+++ b/documentation/Poster_ppt/NEW_POSTER.pptx
@@ -6027,8 +6027,8 @@
         </p:blipFill>
         <p:spPr>
           <a:xfrm>
-            <a:off x="362194" y="14676437"/>
-            <a:ext cx="10401452" cy="6507860"/>
+            <a:off x="643015" y="14406664"/>
+            <a:ext cx="9839811" cy="6156459"/>
           </a:xfrm>
           <a:prstGeom prst="rect">
             <a:avLst/>
@@ -6657,51 +6657,6 @@
       </p:sp>
       <p:sp>
         <p:nvSpPr>
-          <p:cNvPr id="71" name="TextBox 70">
-            <a:extLst>
-              <a:ext uri="{FF2B5EF4-FFF2-40B4-BE49-F238E27FC236}">
-                <a16:creationId xmlns:a16="http://schemas.microsoft.com/office/drawing/2014/main" id="{2CC1BBBB-CF94-FF4D-850E-4AD69ED00EE4}"/>
-              </a:ext>
-            </a:extLst>
-          </p:cNvPr>
-          <p:cNvSpPr txBox="1"/>
-          <p:nvPr/>
-        </p:nvSpPr>
-        <p:spPr>
-          <a:xfrm>
-            <a:off x="13385054" y="26911590"/>
-            <a:ext cx="4035079" cy="812530"/>
-          </a:xfrm>
-          <a:prstGeom prst="rect">
-            <a:avLst/>
-          </a:prstGeom>
-          <a:noFill/>
-        </p:spPr>
-        <p:txBody>
-          <a:bodyPr wrap="none" rtlCol="0">
-            <a:spAutoFit/>
-          </a:bodyPr>
-          <a:lstStyle/>
-          <a:p>
-            <a:r>
-              <a:rPr lang="en-US" sz="2400" dirty="0">
-                <a:latin typeface="Helvetica" pitchFamily="2" charset="0"/>
-              </a:rPr>
-              <a:t>Heart disease mortality rate </a:t>
-            </a:r>
-            <a:endParaRPr lang="en-US" dirty="0">
-              <a:latin typeface="Helvetica" pitchFamily="2" charset="0"/>
-            </a:endParaRPr>
-          </a:p>
-          <a:p>
-            <a:endParaRPr lang="en-US" dirty="0">
-              <a:latin typeface="Helvetica" pitchFamily="2" charset="0"/>
-            </a:endParaRPr>
-          </a:p>
-        </p:txBody>
-      </p:sp>
-      <p:sp>
-        <p:nvSpPr>
           <p:cNvPr id="72" name="TextBox 71">
             <a:extLst>
               <a:ext uri="{FF2B5EF4-FFF2-40B4-BE49-F238E27FC236}">
@@ -6714,8 +6669,8 @@
         </p:nvSpPr>
         <p:spPr>
           <a:xfrm>
-            <a:off x="11133039" y="30184894"/>
-            <a:ext cx="4655442" cy="812530"/>
+            <a:off x="11117165" y="30044218"/>
+            <a:ext cx="4595346" cy="1181862"/>
           </a:xfrm>
           <a:prstGeom prst="rect">
             <a:avLst/>
@@ -6723,24 +6678,33 @@
           <a:noFill/>
         </p:spPr>
         <p:txBody>
-          <a:bodyPr wrap="none" rtlCol="0">
+          <a:bodyPr wrap="square" rtlCol="0">
             <a:spAutoFit/>
           </a:bodyPr>
           <a:lstStyle/>
           <a:p>
             <a:pPr algn="ctr"/>
             <a:r>
-              <a:rPr lang="en-US" sz="2400" dirty="0">
-                <a:latin typeface="Helvetica" pitchFamily="2" charset="0"/>
-              </a:rPr>
-              <a:t>Overall social vulnerability index </a:t>
-            </a:r>
-            <a:endParaRPr lang="en-US" dirty="0">
+              <a:rPr lang="en-US" sz="2400" b="1" dirty="0">
+                <a:solidFill>
+                  <a:srgbClr val="0070C0"/>
+                </a:solidFill>
+                <a:latin typeface="Helvetica" pitchFamily="2" charset="0"/>
+              </a:rPr>
+              <a:t>Figure 5. Overall social Vulnerability Index </a:t>
+            </a:r>
+            <a:endParaRPr lang="en-US" b="1" dirty="0">
+              <a:solidFill>
+                <a:srgbClr val="0070C0"/>
+              </a:solidFill>
               <a:latin typeface="Helvetica" pitchFamily="2" charset="0"/>
             </a:endParaRPr>
           </a:p>
           <a:p>
-            <a:endParaRPr lang="en-US" dirty="0">
+            <a:endParaRPr lang="en-US" b="1" dirty="0">
+              <a:solidFill>
+                <a:srgbClr val="0070C0"/>
+              </a:solidFill>
               <a:latin typeface="Helvetica" pitchFamily="2" charset="0"/>
             </a:endParaRPr>
           </a:p>
@@ -6768,7 +6732,7 @@
         </p:blipFill>
         <p:spPr>
           <a:xfrm>
-            <a:off x="22535165" y="6240671"/>
+            <a:off x="22535165" y="6123441"/>
             <a:ext cx="5985169" cy="3845496"/>
           </a:xfrm>
           <a:prstGeom prst="rect">
@@ -6790,8 +6754,8 @@
         </p:nvSpPr>
         <p:spPr>
           <a:xfrm>
-            <a:off x="16111995" y="30211884"/>
-            <a:ext cx="4019886" cy="1181862"/>
+            <a:off x="16111995" y="30041643"/>
+            <a:ext cx="4019886" cy="1551194"/>
           </a:xfrm>
           <a:prstGeom prst="rect">
             <a:avLst/>
@@ -6806,14 +6770,20 @@
           <a:p>
             <a:pPr algn="ctr"/>
             <a:r>
-              <a:rPr lang="en-US" sz="2400" dirty="0">
-                <a:latin typeface="Helvetica" pitchFamily="2" charset="0"/>
-              </a:rPr>
-              <a:t>Household Composition and Disability </a:t>
-            </a:r>
-          </a:p>
-          <a:p>
-            <a:endParaRPr lang="en-US" dirty="0">
+              <a:rPr lang="en-US" sz="2400" b="1" dirty="0">
+                <a:solidFill>
+                  <a:srgbClr val="0070C0"/>
+                </a:solidFill>
+                <a:latin typeface="Helvetica" pitchFamily="2" charset="0"/>
+              </a:rPr>
+              <a:t>Figure 6. Household Composition and Disability </a:t>
+            </a:r>
+          </a:p>
+          <a:p>
+            <a:endParaRPr lang="en-US" b="1" dirty="0">
+              <a:solidFill>
+                <a:srgbClr val="0070C0"/>
+              </a:solidFill>
               <a:latin typeface="Helvetica" pitchFamily="2" charset="0"/>
             </a:endParaRPr>
           </a:p>
@@ -6833,8 +6803,8 @@
         </p:nvSpPr>
         <p:spPr>
           <a:xfrm>
-            <a:off x="16433946" y="33720565"/>
-            <a:ext cx="3316935" cy="812530"/>
+            <a:off x="15625234" y="33720565"/>
+            <a:ext cx="4934364" cy="812530"/>
           </a:xfrm>
           <a:prstGeom prst="rect">
             <a:avLst/>
@@ -6849,14 +6819,20 @@
           <a:p>
             <a:pPr algn="ctr"/>
             <a:r>
-              <a:rPr lang="en-US" sz="2400" dirty="0">
-                <a:latin typeface="Helvetica" pitchFamily="2" charset="0"/>
-              </a:rPr>
-              <a:t>Socioeconomic Status </a:t>
-            </a:r>
-          </a:p>
-          <a:p>
-            <a:endParaRPr lang="en-US" dirty="0">
+              <a:rPr lang="en-US" sz="2400" b="1" dirty="0">
+                <a:solidFill>
+                  <a:srgbClr val="0070C0"/>
+                </a:solidFill>
+                <a:latin typeface="Helvetica" pitchFamily="2" charset="0"/>
+              </a:rPr>
+              <a:t>Figure 8. Socioeconomic Status </a:t>
+            </a:r>
+          </a:p>
+          <a:p>
+            <a:endParaRPr lang="en-US" b="1" dirty="0">
+              <a:solidFill>
+                <a:srgbClr val="0070C0"/>
+              </a:solidFill>
               <a:latin typeface="Helvetica" pitchFamily="2" charset="0"/>
             </a:endParaRPr>
           </a:p>
@@ -6876,8 +6852,8 @@
         </p:nvSpPr>
         <p:spPr>
           <a:xfrm>
-            <a:off x="11352204" y="33720565"/>
-            <a:ext cx="4055277" cy="812530"/>
+            <a:off x="11631608" y="33720565"/>
+            <a:ext cx="3496471" cy="1181862"/>
           </a:xfrm>
           <a:prstGeom prst="rect">
             <a:avLst/>
@@ -6892,15 +6868,33 @@
           <a:p>
             <a:pPr algn="ctr"/>
             <a:r>
-              <a:rPr lang="en-US" sz="2400" dirty="0">
-                <a:latin typeface="Helvetica" pitchFamily="2" charset="0"/>
-              </a:rPr>
-              <a:t>Housing and Transportation </a:t>
+              <a:rPr lang="en-US" sz="2400" b="1" dirty="0">
+                <a:solidFill>
+                  <a:srgbClr val="0070C0"/>
+                </a:solidFill>
+                <a:latin typeface="Helvetica" pitchFamily="2" charset="0"/>
+              </a:rPr>
+              <a:t>Figure 7. Housing and </a:t>
             </a:r>
           </a:p>
           <a:p>
             <a:pPr algn="ctr"/>
-            <a:endParaRPr lang="en-US" dirty="0">
+            <a:r>
+              <a:rPr lang="en-US" sz="2400" b="1" dirty="0">
+                <a:solidFill>
+                  <a:srgbClr val="0070C0"/>
+                </a:solidFill>
+                <a:latin typeface="Helvetica" pitchFamily="2" charset="0"/>
+              </a:rPr>
+              <a:t>Transportation </a:t>
+            </a:r>
+          </a:p>
+          <a:p>
+            <a:pPr algn="ctr"/>
+            <a:endParaRPr lang="en-US" b="1" dirty="0">
+              <a:solidFill>
+                <a:srgbClr val="0070C0"/>
+              </a:solidFill>
               <a:latin typeface="Helvetica" pitchFamily="2" charset="0"/>
             </a:endParaRPr>
           </a:p>
@@ -7148,7 +7142,7 @@
         </p:blipFill>
         <p:spPr>
           <a:xfrm>
-            <a:off x="21164259" y="13800007"/>
+            <a:off x="21164259" y="13659331"/>
             <a:ext cx="9143222" cy="4838830"/>
           </a:xfrm>
           <a:prstGeom prst="rect">
@@ -7170,7 +7164,7 @@
         </p:nvSpPr>
         <p:spPr>
           <a:xfrm>
-            <a:off x="21132847" y="18672115"/>
+            <a:off x="21132847" y="19117589"/>
             <a:ext cx="9830533" cy="2862322"/>
           </a:xfrm>
           <a:prstGeom prst="rect">
@@ -7461,8 +7455,8 @@
         </p:blipFill>
         <p:spPr>
           <a:xfrm>
-            <a:off x="23859596" y="28076021"/>
-            <a:ext cx="4228174" cy="3800810"/>
+            <a:off x="24097538" y="27820993"/>
+            <a:ext cx="3752290" cy="3373027"/>
           </a:xfrm>
           <a:prstGeom prst="rect">
             <a:avLst/>
@@ -7910,8 +7904,8 @@
         </p:blipFill>
         <p:spPr>
           <a:xfrm>
-            <a:off x="29271118" y="39737746"/>
-            <a:ext cx="1535256" cy="1535256"/>
+            <a:off x="29578135" y="40027122"/>
+            <a:ext cx="1343714" cy="1343714"/>
           </a:xfrm>
           <a:prstGeom prst="rect">
             <a:avLst/>
@@ -7932,7 +7926,7 @@
         </p:nvSpPr>
         <p:spPr>
           <a:xfrm>
-            <a:off x="22340659" y="39966765"/>
+            <a:off x="22328708" y="40259287"/>
             <a:ext cx="6790422" cy="1077218"/>
           </a:xfrm>
           <a:prstGeom prst="rect">
@@ -8016,36 +8010,6 @@
       </p:pic>
       <p:pic>
         <p:nvPicPr>
-          <p:cNvPr id="13" name="Picture 12" descr="A picture containing text, map&#10;&#10;Description automatically generated">
-            <a:extLst>
-              <a:ext uri="{FF2B5EF4-FFF2-40B4-BE49-F238E27FC236}">
-                <a16:creationId xmlns:a16="http://schemas.microsoft.com/office/drawing/2014/main" id="{190679CE-FE05-4AED-B757-339CC6974D19}"/>
-              </a:ext>
-            </a:extLst>
-          </p:cNvPr>
-          <p:cNvPicPr>
-            <a:picLocks noChangeAspect="1"/>
-          </p:cNvPicPr>
-          <p:nvPr/>
-        </p:nvPicPr>
-        <p:blipFill>
-          <a:blip r:embed="rId25"/>
-          <a:stretch>
-            <a:fillRect/>
-          </a:stretch>
-        </p:blipFill>
-        <p:spPr>
-          <a:xfrm>
-            <a:off x="11098265" y="27472931"/>
-            <a:ext cx="4466549" cy="2512434"/>
-          </a:xfrm>
-          <a:prstGeom prst="rect">
-            <a:avLst/>
-          </a:prstGeom>
-        </p:spPr>
-      </p:pic>
-      <p:pic>
-        <p:nvPicPr>
           <p:cNvPr id="17" name="Picture 16">
             <a:extLst>
               <a:ext uri="{FF2B5EF4-FFF2-40B4-BE49-F238E27FC236}">
@@ -8148,8 +8112,8 @@
         </p:nvSpPr>
         <p:spPr>
           <a:xfrm>
-            <a:off x="12345057" y="38567195"/>
-            <a:ext cx="6663812" cy="461665"/>
+            <a:off x="11428142" y="38567195"/>
+            <a:ext cx="8497647" cy="461665"/>
           </a:xfrm>
           <a:prstGeom prst="rect">
             <a:avLst/>
@@ -8164,12 +8128,18 @@
           <a:p>
             <a:pPr algn="ctr"/>
             <a:r>
-              <a:rPr lang="en-US" sz="2400" dirty="0">
-                <a:latin typeface="Helvetica" pitchFamily="2" charset="0"/>
-              </a:rPr>
-              <a:t>Social Vulnerability and Heart Disease Mortality</a:t>
-            </a:r>
-            <a:endParaRPr lang="en-US" dirty="0">
+              <a:rPr lang="en-US" sz="2400" b="1" dirty="0">
+                <a:solidFill>
+                  <a:srgbClr val="0070C0"/>
+                </a:solidFill>
+                <a:latin typeface="Helvetica" pitchFamily="2" charset="0"/>
+              </a:rPr>
+              <a:t>Figure 9. Social Vulnerability and Heart Disease Mortality</a:t>
+            </a:r>
+            <a:endParaRPr lang="en-US" b="1" dirty="0">
+              <a:solidFill>
+                <a:srgbClr val="0070C0"/>
+              </a:solidFill>
               <a:latin typeface="Helvetica" pitchFamily="2" charset="0"/>
             </a:endParaRPr>
           </a:p>
@@ -8416,7 +8386,8 @@
             </a:pPr>
             <a:r>
               <a:rPr lang="en-US" sz="3000" dirty="0">
-                <a:latin typeface="Helvetica" pitchFamily="2" charset="0"/>
+                <a:latin typeface="Helvetica" panose="020B0604020202020204" pitchFamily="34" charset="0"/>
+                <a:cs typeface="Helvetica" panose="020B0604020202020204" pitchFamily="34" charset="0"/>
               </a:rPr>
               <a:t>Heart disease mortality rate is inversely proportional to median income in NY</a:t>
             </a:r>
@@ -8428,7 +8399,8 @@
             </a:pPr>
             <a:r>
               <a:rPr lang="en-US" sz="3000" dirty="0">
-                <a:latin typeface="Helvetica" pitchFamily="2" charset="0"/>
+                <a:latin typeface="Helvetica" panose="020B0604020202020204" pitchFamily="34" charset="0"/>
+                <a:cs typeface="Helvetica" panose="020B0604020202020204" pitchFamily="34" charset="0"/>
               </a:rPr>
               <a:t>Social vulnerability is a good indicator of heart disease mortality rate in the US</a:t>
             </a:r>
@@ -8440,14 +8412,352 @@
             </a:pPr>
             <a:r>
               <a:rPr lang="en-US" sz="3000" dirty="0">
-                <a:latin typeface="Helvetica" pitchFamily="2" charset="0"/>
-              </a:rPr>
-              <a:t>In NY, Asian and Hispanic people are more likely to be affected than other ethnicities</a:t>
-            </a:r>
-          </a:p>
-          <a:p>
-            <a:pPr algn="just"/>
-            <a:endParaRPr lang="en-US" sz="3000" dirty="0">
+                <a:latin typeface="Helvetica" panose="020B0604020202020204" pitchFamily="34" charset="0"/>
+                <a:cs typeface="Helvetica" panose="020B0604020202020204" pitchFamily="34" charset="0"/>
+              </a:rPr>
+              <a:t>In NY, Asian and Pacific Islander has a lower chance of getting heart disease based on their less population in New York state.</a:t>
+            </a:r>
+          </a:p>
+        </p:txBody>
+      </p:sp>
+      <p:pic>
+        <p:nvPicPr>
+          <p:cNvPr id="5" name="Picture 4">
+            <a:extLst>
+              <a:ext uri="{FF2B5EF4-FFF2-40B4-BE49-F238E27FC236}">
+                <a16:creationId xmlns:a16="http://schemas.microsoft.com/office/drawing/2014/main" id="{53CA4512-527F-4220-B00C-70055A203409}"/>
+              </a:ext>
+            </a:extLst>
+          </p:cNvPr>
+          <p:cNvPicPr>
+            <a:picLocks noChangeAspect="1"/>
+          </p:cNvPicPr>
+          <p:nvPr/>
+        </p:nvPicPr>
+        <p:blipFill>
+          <a:blip r:embed="rId30"/>
+          <a:stretch>
+            <a:fillRect/>
+          </a:stretch>
+        </p:blipFill>
+        <p:spPr>
+          <a:xfrm>
+            <a:off x="11117165" y="27511059"/>
+            <a:ext cx="4437184" cy="2495916"/>
+          </a:xfrm>
+          <a:prstGeom prst="rect">
+            <a:avLst/>
+          </a:prstGeom>
+        </p:spPr>
+      </p:pic>
+      <p:sp>
+        <p:nvSpPr>
+          <p:cNvPr id="73" name="TextBox 72">
+            <a:extLst>
+              <a:ext uri="{FF2B5EF4-FFF2-40B4-BE49-F238E27FC236}">
+                <a16:creationId xmlns:a16="http://schemas.microsoft.com/office/drawing/2014/main" id="{FEF0B820-9A53-42C3-ADD5-E4BE80A1A76B}"/>
+              </a:ext>
+            </a:extLst>
+          </p:cNvPr>
+          <p:cNvSpPr txBox="1"/>
+          <p:nvPr/>
+        </p:nvSpPr>
+        <p:spPr>
+          <a:xfrm>
+            <a:off x="2600442" y="20664276"/>
+            <a:ext cx="5097101" cy="461665"/>
+          </a:xfrm>
+          <a:prstGeom prst="rect">
+            <a:avLst/>
+          </a:prstGeom>
+          <a:noFill/>
+        </p:spPr>
+        <p:txBody>
+          <a:bodyPr wrap="none" rtlCol="0">
+            <a:spAutoFit/>
+          </a:bodyPr>
+          <a:lstStyle/>
+          <a:p>
+            <a:r>
+              <a:rPr lang="en-US" sz="2400" b="1" dirty="0">
+                <a:solidFill>
+                  <a:srgbClr val="0070C0"/>
+                </a:solidFill>
+                <a:latin typeface="Helvetica" pitchFamily="2" charset="0"/>
+              </a:rPr>
+              <a:t>Figure 1. Workflow of our Project </a:t>
+            </a:r>
+          </a:p>
+        </p:txBody>
+      </p:sp>
+      <p:sp>
+        <p:nvSpPr>
+          <p:cNvPr id="69" name="TextBox 68">
+            <a:extLst>
+              <a:ext uri="{FF2B5EF4-FFF2-40B4-BE49-F238E27FC236}">
+                <a16:creationId xmlns:a16="http://schemas.microsoft.com/office/drawing/2014/main" id="{4FBC131D-EC02-437D-A731-39C0E892E483}"/>
+              </a:ext>
+            </a:extLst>
+          </p:cNvPr>
+          <p:cNvSpPr txBox="1"/>
+          <p:nvPr/>
+        </p:nvSpPr>
+        <p:spPr>
+          <a:xfrm>
+            <a:off x="11373382" y="10543008"/>
+            <a:ext cx="8529899" cy="461665"/>
+          </a:xfrm>
+          <a:prstGeom prst="rect">
+            <a:avLst/>
+          </a:prstGeom>
+          <a:noFill/>
+        </p:spPr>
+        <p:txBody>
+          <a:bodyPr wrap="none" rtlCol="0">
+            <a:spAutoFit/>
+          </a:bodyPr>
+          <a:lstStyle/>
+          <a:p>
+            <a:r>
+              <a:rPr lang="en-US" sz="2400" b="1" dirty="0">
+                <a:solidFill>
+                  <a:srgbClr val="0070C0"/>
+                </a:solidFill>
+                <a:latin typeface="Helvetica" pitchFamily="2" charset="0"/>
+              </a:rPr>
+              <a:t>Figure 2. Median income vs Heart Disease Mortality Rate </a:t>
+            </a:r>
+          </a:p>
+        </p:txBody>
+      </p:sp>
+      <p:sp>
+        <p:nvSpPr>
+          <p:cNvPr id="74" name="TextBox 73">
+            <a:extLst>
+              <a:ext uri="{FF2B5EF4-FFF2-40B4-BE49-F238E27FC236}">
+                <a16:creationId xmlns:a16="http://schemas.microsoft.com/office/drawing/2014/main" id="{A4479B14-E712-4034-AD74-CBFDF7CE9F0B}"/>
+              </a:ext>
+            </a:extLst>
+          </p:cNvPr>
+          <p:cNvSpPr txBox="1"/>
+          <p:nvPr/>
+        </p:nvSpPr>
+        <p:spPr>
+          <a:xfrm>
+            <a:off x="10726677" y="14827495"/>
+            <a:ext cx="10237098" cy="461665"/>
+          </a:xfrm>
+          <a:prstGeom prst="rect">
+            <a:avLst/>
+          </a:prstGeom>
+          <a:noFill/>
+        </p:spPr>
+        <p:txBody>
+          <a:bodyPr wrap="none" rtlCol="0">
+            <a:spAutoFit/>
+          </a:bodyPr>
+          <a:lstStyle/>
+          <a:p>
+            <a:r>
+              <a:rPr lang="en-US" sz="2400" b="1" dirty="0">
+                <a:solidFill>
+                  <a:srgbClr val="0070C0"/>
+                </a:solidFill>
+                <a:latin typeface="Helvetica" pitchFamily="2" charset="0"/>
+              </a:rPr>
+              <a:t>Figure 3. Median Income and Heart Disease Mortality Rate by County</a:t>
+            </a:r>
+          </a:p>
+        </p:txBody>
+      </p:sp>
+      <p:sp>
+        <p:nvSpPr>
+          <p:cNvPr id="86" name="TextBox 85">
+            <a:extLst>
+              <a:ext uri="{FF2B5EF4-FFF2-40B4-BE49-F238E27FC236}">
+                <a16:creationId xmlns:a16="http://schemas.microsoft.com/office/drawing/2014/main" id="{296ED0F8-7A9B-43BF-8E33-46FC5A15F8B2}"/>
+              </a:ext>
+            </a:extLst>
+          </p:cNvPr>
+          <p:cNvSpPr txBox="1"/>
+          <p:nvPr/>
+        </p:nvSpPr>
+        <p:spPr>
+          <a:xfrm>
+            <a:off x="11959430" y="26963292"/>
+            <a:ext cx="7212231" cy="461665"/>
+          </a:xfrm>
+          <a:prstGeom prst="rect">
+            <a:avLst/>
+          </a:prstGeom>
+          <a:noFill/>
+        </p:spPr>
+        <p:txBody>
+          <a:bodyPr wrap="none" rtlCol="0">
+            <a:spAutoFit/>
+          </a:bodyPr>
+          <a:lstStyle/>
+          <a:p>
+            <a:r>
+              <a:rPr lang="en-US" sz="2400" b="1" dirty="0">
+                <a:solidFill>
+                  <a:srgbClr val="0070C0"/>
+                </a:solidFill>
+                <a:latin typeface="Helvetica" pitchFamily="2" charset="0"/>
+              </a:rPr>
+              <a:t>Figure 4. Heart Disease Mortality Rate in the US </a:t>
+            </a:r>
+          </a:p>
+        </p:txBody>
+      </p:sp>
+      <p:sp>
+        <p:nvSpPr>
+          <p:cNvPr id="94" name="TextBox 93">
+            <a:extLst>
+              <a:ext uri="{FF2B5EF4-FFF2-40B4-BE49-F238E27FC236}">
+                <a16:creationId xmlns:a16="http://schemas.microsoft.com/office/drawing/2014/main" id="{555CCD96-0DFB-4682-8FC4-7162AA4AB693}"/>
+              </a:ext>
+            </a:extLst>
+          </p:cNvPr>
+          <p:cNvSpPr txBox="1"/>
+          <p:nvPr/>
+        </p:nvSpPr>
+        <p:spPr>
+          <a:xfrm>
+            <a:off x="21897170" y="9957774"/>
+            <a:ext cx="7143302" cy="461665"/>
+          </a:xfrm>
+          <a:prstGeom prst="rect">
+            <a:avLst/>
+          </a:prstGeom>
+          <a:noFill/>
+        </p:spPr>
+        <p:txBody>
+          <a:bodyPr wrap="none" rtlCol="0">
+            <a:spAutoFit/>
+          </a:bodyPr>
+          <a:lstStyle/>
+          <a:p>
+            <a:pPr algn="ctr"/>
+            <a:r>
+              <a:rPr lang="en-US" sz="2400" b="1" dirty="0">
+                <a:solidFill>
+                  <a:srgbClr val="0070C0"/>
+                </a:solidFill>
+                <a:latin typeface="Helvetica" pitchFamily="2" charset="0"/>
+              </a:rPr>
+              <a:t>Figure 10. Ethnicity and Heart Disease Mortality</a:t>
+            </a:r>
+            <a:endParaRPr lang="en-US" b="1" dirty="0">
+              <a:solidFill>
+                <a:srgbClr val="0070C0"/>
+              </a:solidFill>
+              <a:latin typeface="Helvetica" pitchFamily="2" charset="0"/>
+            </a:endParaRPr>
+          </a:p>
+        </p:txBody>
+      </p:sp>
+      <p:sp>
+        <p:nvSpPr>
+          <p:cNvPr id="95" name="TextBox 94">
+            <a:extLst>
+              <a:ext uri="{FF2B5EF4-FFF2-40B4-BE49-F238E27FC236}">
+                <a16:creationId xmlns:a16="http://schemas.microsoft.com/office/drawing/2014/main" id="{A89439BC-0D88-4AD6-BA73-84AFCDB47BCA}"/>
+              </a:ext>
+            </a:extLst>
+          </p:cNvPr>
+          <p:cNvSpPr txBox="1"/>
+          <p:nvPr/>
+        </p:nvSpPr>
+        <p:spPr>
+          <a:xfrm>
+            <a:off x="22339605" y="18313845"/>
+            <a:ext cx="7297832" cy="830997"/>
+          </a:xfrm>
+          <a:prstGeom prst="rect">
+            <a:avLst/>
+          </a:prstGeom>
+          <a:noFill/>
+        </p:spPr>
+        <p:txBody>
+          <a:bodyPr wrap="none" rtlCol="0">
+            <a:spAutoFit/>
+          </a:bodyPr>
+          <a:lstStyle/>
+          <a:p>
+            <a:pPr algn="ctr"/>
+            <a:r>
+              <a:rPr lang="en-US" sz="2400" b="1" dirty="0">
+                <a:solidFill>
+                  <a:srgbClr val="0070C0"/>
+                </a:solidFill>
+                <a:latin typeface="Helvetica" pitchFamily="2" charset="0"/>
+              </a:rPr>
+              <a:t>Figure 11. Correlation of Heart Disease Mortality </a:t>
+            </a:r>
+          </a:p>
+          <a:p>
+            <a:pPr algn="ctr"/>
+            <a:r>
+              <a:rPr lang="en-US" sz="2400" b="1" dirty="0">
+                <a:solidFill>
+                  <a:srgbClr val="0070C0"/>
+                </a:solidFill>
+                <a:latin typeface="Helvetica" pitchFamily="2" charset="0"/>
+              </a:rPr>
+              <a:t>with various SVI</a:t>
+            </a:r>
+            <a:endParaRPr lang="en-US" b="1" dirty="0">
+              <a:solidFill>
+                <a:srgbClr val="0070C0"/>
+              </a:solidFill>
+              <a:latin typeface="Helvetica" pitchFamily="2" charset="0"/>
+            </a:endParaRPr>
+          </a:p>
+        </p:txBody>
+      </p:sp>
+      <p:sp>
+        <p:nvSpPr>
+          <p:cNvPr id="96" name="TextBox 95">
+            <a:extLst>
+              <a:ext uri="{FF2B5EF4-FFF2-40B4-BE49-F238E27FC236}">
+                <a16:creationId xmlns:a16="http://schemas.microsoft.com/office/drawing/2014/main" id="{1ABB5F85-1852-4E86-87E7-2E426A2E8763}"/>
+              </a:ext>
+            </a:extLst>
+          </p:cNvPr>
+          <p:cNvSpPr txBox="1"/>
+          <p:nvPr/>
+        </p:nvSpPr>
+        <p:spPr>
+          <a:xfrm>
+            <a:off x="23752820" y="31199630"/>
+            <a:ext cx="4968668" cy="461665"/>
+          </a:xfrm>
+          <a:prstGeom prst="rect">
+            <a:avLst/>
+          </a:prstGeom>
+          <a:noFill/>
+        </p:spPr>
+        <p:txBody>
+          <a:bodyPr wrap="none" rtlCol="0">
+            <a:spAutoFit/>
+          </a:bodyPr>
+          <a:lstStyle/>
+          <a:p>
+            <a:pPr algn="ctr"/>
+            <a:r>
+              <a:rPr lang="en-US" sz="2400" b="1" dirty="0">
+                <a:solidFill>
+                  <a:srgbClr val="0070C0"/>
+                </a:solidFill>
+                <a:latin typeface="Helvetica" pitchFamily="2" charset="0"/>
+              </a:rPr>
+              <a:t>Figure 12. SVM Confusion Matrix</a:t>
+            </a:r>
+            <a:endParaRPr lang="en-US" b="1" dirty="0">
+              <a:solidFill>
+                <a:srgbClr val="0070C0"/>
+              </a:solidFill>
               <a:latin typeface="Helvetica" pitchFamily="2" charset="0"/>
             </a:endParaRPr>
           </a:p>

</xml_diff>